<commit_message>
Add some minor changes (spelling)
</commit_message>
<xml_diff>
--- a/rbc_sab-berlin_2016/Poster_RBC_SAB-Meeting _2016_AE_BB_AEBB.pptx
+++ b/rbc_sab-berlin_2016/Poster_RBC_SAB-Meeting _2016_AE_BB_AEBB.pptx
@@ -207,11 +207,11 @@
           <c:showBubbleSize val="0"/>
         </c:dLbls>
         <c:gapWidth val="75"/>
-        <c:axId val="2085207096"/>
-        <c:axId val="2085209768"/>
+        <c:axId val="2021106344"/>
+        <c:axId val="2123799512"/>
       </c:barChart>
       <c:catAx>
-        <c:axId val="2085207096"/>
+        <c:axId val="2021106344"/>
         <c:scaling>
           <c:orientation val="minMax"/>
         </c:scaling>
@@ -250,7 +250,7 @@
             <a:endParaRPr lang="en-US"/>
           </a:p>
         </c:txPr>
-        <c:crossAx val="2085209768"/>
+        <c:crossAx val="2123799512"/>
         <c:crosses val="autoZero"/>
         <c:auto val="1"/>
         <c:lblAlgn val="ctr"/>
@@ -258,7 +258,7 @@
         <c:noMultiLvlLbl val="1"/>
       </c:catAx>
       <c:valAx>
-        <c:axId val="2085209768"/>
+        <c:axId val="2123799512"/>
         <c:scaling>
           <c:orientation val="minMax"/>
         </c:scaling>
@@ -304,7 +304,7 @@
             <a:endParaRPr lang="en-US"/>
           </a:p>
         </c:txPr>
-        <c:crossAx val="2085207096"/>
+        <c:crossAx val="2021106344"/>
         <c:crossesAt val="1.0"/>
         <c:crossBetween val="between"/>
         <c:majorUnit val="100.0"/>
@@ -4749,20 +4749,7 @@
                   </a:solidFill>
                 </a:uFill>
               </a:rPr>
-              <a:t>We </a:t>
-            </a:r>
-            <a:r>
-              <a:rPr lang="en-US" sz="3200" spc="-1" dirty="0" smtClean="0">
-                <a:solidFill>
-                  <a:srgbClr val="000000"/>
-                </a:solidFill>
-                <a:uFill>
-                  <a:solidFill>
-                    <a:srgbClr val="FFFFFF"/>
-                  </a:solidFill>
-                </a:uFill>
-              </a:rPr>
-              <a:t>also </a:t>
+              <a:t>We also </a:t>
             </a:r>
             <a:r>
               <a:rPr lang="en-US" sz="3200" spc="-1" dirty="0">
@@ -6519,22 +6506,7 @@
                   <a:latin typeface="Arial"/>
                   <a:ea typeface="DejaVu Sans"/>
                 </a:rPr>
-                <a:t>enables scientists </a:t>
-              </a:r>
-              <a:r>
-                <a:rPr lang="en-US" sz="3200" b="0" strike="noStrike" spc="-1" dirty="0" smtClean="0">
-                  <a:solidFill>
-                    <a:srgbClr val="000000"/>
-                  </a:solidFill>
-                  <a:uFill>
-                    <a:solidFill>
-                      <a:srgbClr val="FFFFFF"/>
-                    </a:solidFill>
-                  </a:uFill>
-                  <a:latin typeface="Arial"/>
-                  <a:ea typeface="DejaVu Sans"/>
-                </a:rPr>
-                <a:t>to perform accessible</a:t>
+                <a:t>enables scientists to perform accessible</a:t>
               </a:r>
               <a:r>
                 <a:rPr lang="en-US" sz="3200" b="0" strike="noStrike" spc="-1" dirty="0">
@@ -6934,7 +6906,7 @@
                   </a:uFill>
                   <a:hlinkClick r:id="rId17"/>
                 </a:rPr>
-                <a:t>http://rna.informatik.uni-freiburg.de</a:t>
+                <a:t>http://rna.informatik.uni-</a:t>
               </a:r>
               <a:r>
                 <a:rPr lang="en-US" sz="3200" spc="-1" dirty="0" smtClean="0">
@@ -6948,7 +6920,7 @@
                   </a:uFill>
                   <a:hlinkClick r:id="rId17"/>
                 </a:rPr>
-                <a:t>/</a:t>
+                <a:t>freiburg.de</a:t>
               </a:r>
               <a:r>
                 <a:rPr lang="en-US" sz="3200" spc="-1" dirty="0" smtClean="0">
@@ -6962,7 +6934,21 @@
                   </a:uFill>
                   <a:latin typeface="Arial"/>
                 </a:rPr>
-                <a:t>) is a s</a:t>
+                <a:t>) </a:t>
+              </a:r>
+              <a:r>
+                <a:rPr lang="en-US" sz="3200" spc="-1" dirty="0" smtClean="0">
+                  <a:solidFill>
+                    <a:srgbClr val="000000"/>
+                  </a:solidFill>
+                  <a:uFill>
+                    <a:solidFill>
+                      <a:srgbClr val="FFFFFF"/>
+                    </a:solidFill>
+                  </a:uFill>
+                  <a:latin typeface="Arial"/>
+                </a:rPr>
+                <a:t>is a s</a:t>
               </a:r>
               <a:r>
                 <a:rPr lang="en-US" sz="3200" b="0" strike="noStrike" spc="-1" dirty="0" smtClean="0">
@@ -7006,17 +6992,6 @@
                 </a:rPr>
                 <a:t>tools:</a:t>
               </a:r>
-              <a:endParaRPr lang="en-US" sz="3200" b="0" strike="noStrike" spc="-1" dirty="0" smtClean="0">
-                <a:solidFill>
-                  <a:srgbClr val="000000"/>
-                </a:solidFill>
-                <a:uFill>
-                  <a:solidFill>
-                    <a:srgbClr val="FFFFFF"/>
-                  </a:solidFill>
-                </a:uFill>
-                <a:latin typeface="Arial"/>
-              </a:endParaRPr>
             </a:p>
             <a:p>
               <a:pPr marL="457200" indent="-457200" algn="just">
@@ -7829,7 +7804,7 @@
           <p:nvPr>
             <p:extLst>
               <p:ext uri="{D42A27DB-BD31-4B8C-83A1-F6EECF244321}">
-                <p14:modId xmlns:p14="http://schemas.microsoft.com/office/powerpoint/2010/main" val="3853768028"/>
+                <p14:modId xmlns:p14="http://schemas.microsoft.com/office/powerpoint/2010/main" val="3183830329"/>
               </p:ext>
             </p:extLst>
           </p:nvPr>
@@ -7870,17 +7845,6 @@
                         </a:rPr>
                         <a:t>2016 past and planned events</a:t>
                       </a:r>
-                      <a:endParaRPr lang="en-US" sz="2800" b="1" strike="noStrike" spc="-1" dirty="0" smtClean="0">
-                        <a:solidFill>
-                          <a:srgbClr val="000000"/>
-                        </a:solidFill>
-                        <a:uFill>
-                          <a:solidFill>
-                            <a:srgbClr val="FFFFFF"/>
-                          </a:solidFill>
-                        </a:uFill>
-                        <a:latin typeface="+mn-lt"/>
-                      </a:endParaRPr>
                     </a:p>
                   </a:txBody>
                   <a:tcPr/>
@@ -7980,21 +7944,7 @@
                           </a:uFill>
                           <a:latin typeface="+mn-lt"/>
                         </a:rPr>
-                        <a:t> </a:t>
-                      </a:r>
-                      <a:r>
-                        <a:rPr lang="en-US" sz="2800" b="0" strike="noStrike" spc="-1" baseline="0" dirty="0" smtClean="0">
-                          <a:solidFill>
-                            <a:srgbClr val="000000"/>
-                          </a:solidFill>
-                          <a:uFill>
-                            <a:solidFill>
-                              <a:srgbClr val="FFFFFF"/>
-                            </a:solidFill>
-                          </a:uFill>
-                          <a:latin typeface="+mn-lt"/>
-                        </a:rPr>
-                        <a:t>Jan</a:t>
+                        <a:t> Jan</a:t>
                       </a:r>
                       <a:endParaRPr lang="en-US" sz="2800" b="0" strike="noStrike" spc="-1" dirty="0" smtClean="0">
                         <a:solidFill>
@@ -8141,21 +8091,7 @@
                           </a:uFill>
                           <a:latin typeface="+mn-lt"/>
                         </a:rPr>
-                        <a:t> </a:t>
-                      </a:r>
-                      <a:r>
-                        <a:rPr lang="en-US" sz="2800" b="0" strike="noStrike" spc="-1" baseline="0" dirty="0" smtClean="0">
-                          <a:solidFill>
-                            <a:srgbClr val="000000"/>
-                          </a:solidFill>
-                          <a:uFill>
-                            <a:solidFill>
-                              <a:srgbClr val="FFFFFF"/>
-                            </a:solidFill>
-                          </a:uFill>
-                          <a:latin typeface="+mn-lt"/>
-                        </a:rPr>
-                        <a:t>Feb</a:t>
+                        <a:t> Feb</a:t>
                       </a:r>
                       <a:endParaRPr lang="en-US" sz="2800" b="0" strike="noStrike" spc="-1" dirty="0" smtClean="0">
                         <a:solidFill>
@@ -8329,22 +8265,7 @@
                           <a:latin typeface="+mn-lt"/>
                           <a:ea typeface="+mn-ea"/>
                         </a:rPr>
-                        <a:t> </a:t>
-                      </a:r>
-                      <a:r>
-                        <a:rPr lang="en-US" sz="2800" b="0" strike="noStrike" spc="-1" dirty="0" smtClean="0">
-                          <a:solidFill>
-                            <a:srgbClr val="000000"/>
-                          </a:solidFill>
-                          <a:uFill>
-                            <a:solidFill>
-                              <a:srgbClr val="FFFFFF"/>
-                            </a:solidFill>
-                          </a:uFill>
-                          <a:latin typeface="+mn-lt"/>
-                          <a:ea typeface="+mn-ea"/>
-                        </a:rPr>
-                        <a:t>Mar</a:t>
+                        <a:t> Mar</a:t>
                       </a:r>
                       <a:endParaRPr lang="en-US" sz="2800" b="0" strike="noStrike" spc="-1" dirty="0" smtClean="0">
                         <a:solidFill>
@@ -8492,21 +8413,7 @@
                           </a:uFill>
                           <a:latin typeface="+mn-lt"/>
                         </a:rPr>
-                        <a:t> </a:t>
-                      </a:r>
-                      <a:r>
-                        <a:rPr lang="en-US" sz="2800" b="0" strike="noStrike" spc="-1" baseline="0" dirty="0" smtClean="0">
-                          <a:solidFill>
-                            <a:srgbClr val="000000"/>
-                          </a:solidFill>
-                          <a:uFill>
-                            <a:solidFill>
-                              <a:srgbClr val="FFFFFF"/>
-                            </a:solidFill>
-                          </a:uFill>
-                          <a:latin typeface="+mn-lt"/>
-                        </a:rPr>
-                        <a:t>Apr</a:t>
+                        <a:t> Apr</a:t>
                       </a:r>
                       <a:endParaRPr lang="en-US" sz="2800" b="0" strike="noStrike" spc="-1" dirty="0" smtClean="0">
                         <a:solidFill>
@@ -8684,22 +8591,7 @@
                           <a:latin typeface="+mn-lt"/>
                           <a:ea typeface="+mn-ea"/>
                         </a:rPr>
-                        <a:t> </a:t>
-                      </a:r>
-                      <a:r>
-                        <a:rPr lang="en-US" sz="2800" b="0" strike="noStrike" spc="-1" dirty="0" smtClean="0">
-                          <a:solidFill>
-                            <a:srgbClr val="000000"/>
-                          </a:solidFill>
-                          <a:uFill>
-                            <a:solidFill>
-                              <a:srgbClr val="FFFFFF"/>
-                            </a:solidFill>
-                          </a:uFill>
-                          <a:latin typeface="+mn-lt"/>
-                          <a:ea typeface="+mn-ea"/>
-                        </a:rPr>
-                        <a:t>Apr</a:t>
+                        <a:t> Apr</a:t>
                       </a:r>
                       <a:endParaRPr lang="en-US" sz="2800" b="0" strike="noStrike" spc="-1" dirty="0" smtClean="0">
                         <a:solidFill>
@@ -8874,22 +8766,7 @@
                           <a:latin typeface="+mn-lt"/>
                           <a:ea typeface="+mn-ea"/>
                         </a:rPr>
-                        <a:t> </a:t>
-                      </a:r>
-                      <a:r>
-                        <a:rPr lang="en-US" sz="2800" b="0" strike="noStrike" spc="-1" dirty="0" smtClean="0">
-                          <a:solidFill>
-                            <a:srgbClr val="000000"/>
-                          </a:solidFill>
-                          <a:uFill>
-                            <a:solidFill>
-                              <a:srgbClr val="FFFFFF"/>
-                            </a:solidFill>
-                          </a:uFill>
-                          <a:latin typeface="+mn-lt"/>
-                          <a:ea typeface="+mn-ea"/>
-                        </a:rPr>
-                        <a:t>Apr</a:t>
+                        <a:t> Apr</a:t>
                       </a:r>
                       <a:endParaRPr lang="en-US" sz="2800" b="0" strike="noStrike" spc="-1" dirty="0" smtClean="0">
                         <a:solidFill>
@@ -9026,22 +8903,7 @@
                           <a:latin typeface="+mn-lt"/>
                           <a:ea typeface="+mn-ea"/>
                         </a:rPr>
-                        <a:t> </a:t>
-                      </a:r>
-                      <a:r>
-                        <a:rPr lang="en-US" sz="2800" b="0" strike="noStrike" spc="-1" dirty="0" smtClean="0">
-                          <a:solidFill>
-                            <a:srgbClr val="000000"/>
-                          </a:solidFill>
-                          <a:uFill>
-                            <a:solidFill>
-                              <a:srgbClr val="FFFFFF"/>
-                            </a:solidFill>
-                          </a:uFill>
-                          <a:latin typeface="+mn-lt"/>
-                          <a:ea typeface="+mn-ea"/>
-                        </a:rPr>
-                        <a:t>Jun</a:t>
+                        <a:t> Jun</a:t>
                       </a:r>
                       <a:endParaRPr lang="en-US" sz="2800" b="0" strike="noStrike" spc="-1" dirty="0" smtClean="0">
                         <a:solidFill>
@@ -9281,22 +9143,7 @@
                           <a:latin typeface="+mn-lt"/>
                           <a:ea typeface="+mn-ea"/>
                         </a:rPr>
-                        <a:t> </a:t>
-                      </a:r>
-                      <a:r>
-                        <a:rPr lang="en-US" sz="2800" b="0" strike="noStrike" spc="-1" baseline="0" dirty="0" smtClean="0">
-                          <a:solidFill>
-                            <a:srgbClr val="000000"/>
-                          </a:solidFill>
-                          <a:uFill>
-                            <a:solidFill>
-                              <a:srgbClr val="FFFFFF"/>
-                            </a:solidFill>
-                          </a:uFill>
-                          <a:latin typeface="+mn-lt"/>
-                          <a:ea typeface="+mn-ea"/>
-                        </a:rPr>
-                        <a:t>Sep</a:t>
+                        <a:t> Sep</a:t>
                       </a:r>
                       <a:endParaRPr lang="en-US" sz="2800" b="0" strike="noStrike" spc="-1" dirty="0" smtClean="0">
                         <a:solidFill>
@@ -9459,35 +9306,8 @@
                           <a:latin typeface="+mn-lt"/>
                           <a:ea typeface="+mn-ea"/>
                         </a:rPr>
-                        <a:t> </a:t>
-                      </a:r>
-                      <a:r>
-                        <a:rPr lang="en-US" sz="2800" b="0" strike="noStrike" spc="-1" dirty="0" smtClean="0">
-                          <a:solidFill>
-                            <a:srgbClr val="000000"/>
-                          </a:solidFill>
-                          <a:uFill>
-                            <a:solidFill>
-                              <a:srgbClr val="FFFFFF"/>
-                            </a:solidFill>
-                          </a:uFill>
-                          <a:latin typeface="+mn-lt"/>
-                          <a:ea typeface="+mn-ea"/>
-                        </a:rPr>
-                        <a:t>Sep</a:t>
-                      </a:r>
-                      <a:endParaRPr lang="en-US" sz="2800" b="0" strike="noStrike" spc="-1" dirty="0" smtClean="0">
-                        <a:solidFill>
-                          <a:srgbClr val="000000"/>
-                        </a:solidFill>
-                        <a:uFill>
-                          <a:solidFill>
-                            <a:srgbClr val="FFFFFF"/>
-                          </a:solidFill>
-                        </a:uFill>
-                        <a:latin typeface="+mn-lt"/>
-                        <a:ea typeface="+mn-ea"/>
-                      </a:endParaRPr>
+                        <a:t> Sep</a:t>
+                      </a:r>
                     </a:p>
                   </a:txBody>
                   <a:tcPr/>
@@ -9730,22 +9550,7 @@
                           <a:latin typeface="+mn-lt"/>
                           <a:ea typeface="+mn-ea"/>
                         </a:rPr>
-                        <a:t> </a:t>
-                      </a:r>
-                      <a:r>
-                        <a:rPr lang="en-US" sz="2800" b="0" strike="noStrike" spc="-1" dirty="0" smtClean="0">
-                          <a:solidFill>
-                            <a:srgbClr val="000000"/>
-                          </a:solidFill>
-                          <a:uFill>
-                            <a:solidFill>
-                              <a:srgbClr val="FFFFFF"/>
-                            </a:solidFill>
-                          </a:uFill>
-                          <a:latin typeface="+mn-lt"/>
-                          <a:ea typeface="+mn-ea"/>
-                        </a:rPr>
-                        <a:t>Oct</a:t>
+                        <a:t> Oct</a:t>
                       </a:r>
                       <a:endParaRPr lang="en-US" sz="2800" b="0" strike="noStrike" spc="-1" dirty="0" smtClean="0">
                         <a:solidFill>
@@ -9962,35 +9767,8 @@
                           <a:latin typeface="+mn-lt"/>
                           <a:ea typeface="+mn-ea"/>
                         </a:rPr>
-                        <a:t> </a:t>
-                      </a:r>
-                      <a:r>
-                        <a:rPr lang="en-US" sz="2800" b="0" strike="noStrike" spc="-1" dirty="0" smtClean="0">
-                          <a:solidFill>
-                            <a:srgbClr val="000000"/>
-                          </a:solidFill>
-                          <a:uFill>
-                            <a:solidFill>
-                              <a:srgbClr val="FFFFFF"/>
-                            </a:solidFill>
-                          </a:uFill>
-                          <a:latin typeface="+mn-lt"/>
-                          <a:ea typeface="+mn-ea"/>
-                        </a:rPr>
-                        <a:t>Oct</a:t>
-                      </a:r>
-                      <a:endParaRPr lang="en-US" sz="2800" b="0" strike="noStrike" spc="-1" dirty="0" smtClean="0">
-                        <a:solidFill>
-                          <a:srgbClr val="000000"/>
-                        </a:solidFill>
-                        <a:uFill>
-                          <a:solidFill>
-                            <a:srgbClr val="FFFFFF"/>
-                          </a:solidFill>
-                        </a:uFill>
-                        <a:latin typeface="+mn-lt"/>
-                        <a:ea typeface="+mn-ea"/>
-                      </a:endParaRPr>
+                        <a:t> Oct</a:t>
+                      </a:r>
                     </a:p>
                   </a:txBody>
                   <a:tcPr/>
@@ -10184,35 +9962,8 @@
                           <a:latin typeface="+mn-lt"/>
                           <a:ea typeface="+mn-ea"/>
                         </a:rPr>
-                        <a:t> </a:t>
-                      </a:r>
-                      <a:r>
-                        <a:rPr lang="en-US" sz="2800" b="0" strike="noStrike" spc="-1" dirty="0" smtClean="0">
-                          <a:solidFill>
-                            <a:srgbClr val="000000"/>
-                          </a:solidFill>
-                          <a:uFill>
-                            <a:solidFill>
-                              <a:srgbClr val="FFFFFF"/>
-                            </a:solidFill>
-                          </a:uFill>
-                          <a:latin typeface="+mn-lt"/>
-                          <a:ea typeface="+mn-ea"/>
-                        </a:rPr>
-                        <a:t>Oct</a:t>
-                      </a:r>
-                      <a:endParaRPr lang="en-US" sz="2800" b="0" strike="noStrike" spc="-1" dirty="0" smtClean="0">
-                        <a:solidFill>
-                          <a:srgbClr val="000000"/>
-                        </a:solidFill>
-                        <a:uFill>
-                          <a:solidFill>
-                            <a:srgbClr val="FFFFFF"/>
-                          </a:solidFill>
-                        </a:uFill>
-                        <a:latin typeface="+mn-lt"/>
-                        <a:ea typeface="+mn-ea"/>
-                      </a:endParaRPr>
+                        <a:t> Oct</a:t>
+                      </a:r>
                     </a:p>
                   </a:txBody>
                   <a:tcPr/>
@@ -10443,22 +10194,7 @@
                           <a:latin typeface="+mn-lt"/>
                           <a:ea typeface="+mn-ea"/>
                         </a:rPr>
-                        <a:t> </a:t>
-                      </a:r>
-                      <a:r>
-                        <a:rPr lang="en-US" sz="2800" b="0" strike="noStrike" spc="-1" dirty="0" smtClean="0">
-                          <a:solidFill>
-                            <a:srgbClr val="000000"/>
-                          </a:solidFill>
-                          <a:uFill>
-                            <a:solidFill>
-                              <a:srgbClr val="FFFFFF"/>
-                            </a:solidFill>
-                          </a:uFill>
-                          <a:latin typeface="+mn-lt"/>
-                          <a:ea typeface="+mn-ea"/>
-                        </a:rPr>
-                        <a:t>Nov</a:t>
+                        <a:t> Nov</a:t>
                       </a:r>
                       <a:endParaRPr lang="en-US" sz="2800" b="0" strike="noStrike" spc="-1" dirty="0" smtClean="0">
                         <a:solidFill>
@@ -10629,22 +10365,7 @@
                           <a:latin typeface="+mn-lt"/>
                           <a:ea typeface="+mn-ea"/>
                         </a:rPr>
-                        <a:t> </a:t>
-                      </a:r>
-                      <a:r>
-                        <a:rPr lang="en-US" sz="2800" b="0" strike="noStrike" spc="-1" dirty="0" smtClean="0">
-                          <a:solidFill>
-                            <a:srgbClr val="000000"/>
-                          </a:solidFill>
-                          <a:uFill>
-                            <a:solidFill>
-                              <a:srgbClr val="FFFFFF"/>
-                            </a:solidFill>
-                          </a:uFill>
-                          <a:latin typeface="+mn-lt"/>
-                          <a:ea typeface="+mn-ea"/>
-                        </a:rPr>
-                        <a:t>Dec</a:t>
+                        <a:t> Dec</a:t>
                       </a:r>
                       <a:endParaRPr lang="en-US" sz="2800" b="0" strike="noStrike" spc="-1" dirty="0" smtClean="0">
                         <a:solidFill>
@@ -10666,7 +10387,30 @@
                     <a:bodyPr/>
                     <a:lstStyle/>
                     <a:p>
-                      <a:endParaRPr lang="en-US" dirty="0"/>
+                      <a:r>
+                        <a:rPr lang="en-US" sz="2800" dirty="0" smtClean="0"/>
+                        <a:t>Galaxy</a:t>
+                      </a:r>
+                      <a:r>
+                        <a:rPr lang="en-US" sz="2800" baseline="0" dirty="0" smtClean="0"/>
+                        <a:t> </a:t>
+                      </a:r>
+                      <a:r>
+                        <a:rPr lang="en-US" sz="2800" dirty="0" err="1" smtClean="0">
+                          <a:solidFill>
+                            <a:schemeClr val="tx1"/>
+                          </a:solidFill>
+                          <a:latin typeface="+mn-lt"/>
+                          <a:ea typeface="+mn-ea"/>
+                          <a:cs typeface="+mn-cs"/>
+                        </a:rPr>
+                        <a:t>Docker</a:t>
+                      </a:r>
+                      <a:r>
+                        <a:rPr lang="en-US" sz="2800" baseline="0" dirty="0" smtClean="0"/>
+                        <a:t> workshop</a:t>
+                      </a:r>
+                      <a:endParaRPr lang="en-US" sz="2800" dirty="0"/>
                     </a:p>
                   </a:txBody>
                   <a:tcPr/>
@@ -10777,22 +10521,7 @@
                           <a:latin typeface="+mn-lt"/>
                           <a:ea typeface="+mn-ea"/>
                         </a:rPr>
-                        <a:t> </a:t>
-                      </a:r>
-                      <a:r>
-                        <a:rPr lang="en-US" sz="2800" b="0" strike="noStrike" spc="-1" dirty="0" smtClean="0">
-                          <a:solidFill>
-                            <a:srgbClr val="000000"/>
-                          </a:solidFill>
-                          <a:uFill>
-                            <a:solidFill>
-                              <a:srgbClr val="FFFFFF"/>
-                            </a:solidFill>
-                          </a:uFill>
-                          <a:latin typeface="+mn-lt"/>
-                          <a:ea typeface="+mn-ea"/>
-                        </a:rPr>
-                        <a:t>Dec</a:t>
+                        <a:t> Dec</a:t>
                       </a:r>
                       <a:endParaRPr lang="en-US" sz="2800" b="0" strike="noStrike" spc="-1" dirty="0" smtClean="0">
                         <a:solidFill>
@@ -10944,22 +10673,7 @@
                           <a:latin typeface="+mn-lt"/>
                           <a:ea typeface="+mn-ea"/>
                         </a:rPr>
-                        <a:t> </a:t>
-                      </a:r>
-                      <a:r>
-                        <a:rPr lang="en-US" sz="2800" b="0" strike="noStrike" spc="-1" dirty="0" smtClean="0">
-                          <a:solidFill>
-                            <a:srgbClr val="000000"/>
-                          </a:solidFill>
-                          <a:uFill>
-                            <a:solidFill>
-                              <a:srgbClr val="FFFFFF"/>
-                            </a:solidFill>
-                          </a:uFill>
-                          <a:latin typeface="+mn-lt"/>
-                          <a:ea typeface="+mn-ea"/>
-                        </a:rPr>
-                        <a:t>Dec</a:t>
+                        <a:t> Dec</a:t>
                       </a:r>
                       <a:endParaRPr lang="en-US" sz="2800" b="0" strike="noStrike" spc="-1" dirty="0" smtClean="0">
                         <a:solidFill>
@@ -11187,17 +10901,6 @@
                         </a:rPr>
                         <a:t>2017 planned events</a:t>
                       </a:r>
-                      <a:endParaRPr lang="en-US" sz="2800" b="1" strike="noStrike" spc="-1" dirty="0" smtClean="0">
-                        <a:solidFill>
-                          <a:srgbClr val="000000"/>
-                        </a:solidFill>
-                        <a:uFill>
-                          <a:solidFill>
-                            <a:srgbClr val="FFFFFF"/>
-                          </a:solidFill>
-                        </a:uFill>
-                        <a:latin typeface="+mn-lt"/>
-                      </a:endParaRPr>
                     </a:p>
                   </a:txBody>
                   <a:tcPr/>
@@ -11314,22 +11017,7 @@
                           <a:latin typeface="+mn-lt"/>
                           <a:ea typeface="+mn-ea"/>
                         </a:rPr>
-                        <a:t> </a:t>
-                      </a:r>
-                      <a:r>
-                        <a:rPr lang="en-US" sz="2800" b="0" strike="noStrike" spc="-1" dirty="0" smtClean="0">
-                          <a:solidFill>
-                            <a:srgbClr val="000000"/>
-                          </a:solidFill>
-                          <a:uFill>
-                            <a:solidFill>
-                              <a:srgbClr val="FFFFFF"/>
-                            </a:solidFill>
-                          </a:uFill>
-                          <a:latin typeface="+mn-lt"/>
-                          <a:ea typeface="+mn-ea"/>
-                        </a:rPr>
-                        <a:t>Jan</a:t>
+                        <a:t> Jan</a:t>
                       </a:r>
                       <a:endParaRPr lang="en-US" sz="2800" b="0" strike="noStrike" spc="-1" dirty="0" smtClean="0">
                         <a:solidFill>
@@ -11494,22 +11182,7 @@
                           <a:latin typeface="+mn-lt"/>
                           <a:ea typeface="+mn-ea"/>
                         </a:rPr>
-                        <a:t> </a:t>
-                      </a:r>
-                      <a:r>
-                        <a:rPr lang="en-US" sz="2800" b="0" strike="noStrike" spc="-1" dirty="0" smtClean="0">
-                          <a:solidFill>
-                            <a:srgbClr val="000000"/>
-                          </a:solidFill>
-                          <a:uFill>
-                            <a:solidFill>
-                              <a:srgbClr val="FFFFFF"/>
-                            </a:solidFill>
-                          </a:uFill>
-                          <a:latin typeface="+mn-lt"/>
-                          <a:ea typeface="+mn-ea"/>
-                        </a:rPr>
-                        <a:t>Jan</a:t>
+                        <a:t> Jan</a:t>
                       </a:r>
                       <a:endParaRPr lang="en-US" sz="2800" b="0" strike="noStrike" spc="-1" dirty="0" smtClean="0">
                         <a:solidFill>
@@ -11693,22 +11366,7 @@
                           <a:latin typeface="+mn-lt"/>
                           <a:ea typeface="+mn-ea"/>
                         </a:rPr>
-                        <a:t> </a:t>
-                      </a:r>
-                      <a:r>
-                        <a:rPr lang="en-US" sz="2800" b="0" strike="noStrike" spc="-1" dirty="0" smtClean="0">
-                          <a:solidFill>
-                            <a:srgbClr val="000000"/>
-                          </a:solidFill>
-                          <a:uFill>
-                            <a:solidFill>
-                              <a:srgbClr val="FFFFFF"/>
-                            </a:solidFill>
-                          </a:uFill>
-                          <a:latin typeface="+mn-lt"/>
-                          <a:ea typeface="+mn-ea"/>
-                        </a:rPr>
-                        <a:t>Jan</a:t>
+                        <a:t> Jan</a:t>
                       </a:r>
                       <a:endParaRPr lang="en-US" sz="2800" b="0" strike="noStrike" spc="-1" dirty="0" smtClean="0">
                         <a:solidFill>
@@ -11888,35 +11546,8 @@
                           <a:latin typeface="+mn-lt"/>
                           <a:ea typeface="+mn-ea"/>
                         </a:rPr>
-                        <a:t> </a:t>
-                      </a:r>
-                      <a:r>
-                        <a:rPr lang="en-US" sz="2800" b="0" strike="noStrike" spc="-1" dirty="0" smtClean="0">
-                          <a:solidFill>
-                            <a:srgbClr val="000000"/>
-                          </a:solidFill>
-                          <a:uFill>
-                            <a:solidFill>
-                              <a:srgbClr val="FFFFFF"/>
-                            </a:solidFill>
-                          </a:uFill>
-                          <a:latin typeface="+mn-lt"/>
-                          <a:ea typeface="+mn-ea"/>
-                        </a:rPr>
-                        <a:t>Feb</a:t>
-                      </a:r>
-                      <a:endParaRPr lang="en-US" sz="2800" b="0" strike="noStrike" spc="-1" dirty="0" smtClean="0">
-                        <a:solidFill>
-                          <a:srgbClr val="000000"/>
-                        </a:solidFill>
-                        <a:uFill>
-                          <a:solidFill>
-                            <a:srgbClr val="FFFFFF"/>
-                          </a:solidFill>
-                        </a:uFill>
-                        <a:latin typeface="+mn-lt"/>
-                        <a:ea typeface="+mn-ea"/>
-                      </a:endParaRPr>
+                        <a:t> Feb</a:t>
+                      </a:r>
                     </a:p>
                   </a:txBody>
                   <a:tcPr/>
@@ -12114,10 +11745,10 @@
                 </a:uFill>
                 <a:hlinkClick r:id="rId19"/>
               </a:rPr>
-              <a:t>http://</a:t>
-            </a:r>
-            <a:r>
-              <a:rPr lang="en-US" sz="3200" spc="-1" dirty="0" err="1">
+              <a:t>http://bgruening.github.io/training-</a:t>
+            </a:r>
+            <a:r>
+              <a:rPr lang="en-US" sz="3200" spc="-1" dirty="0" smtClean="0">
                 <a:solidFill>
                   <a:srgbClr val="146EBA"/>
                 </a:solidFill>
@@ -12128,35 +11759,7 @@
                 </a:uFill>
                 <a:hlinkClick r:id="rId19"/>
               </a:rPr>
-              <a:t>bgruening.github.io</a:t>
-            </a:r>
-            <a:r>
-              <a:rPr lang="en-US" sz="3200" spc="-1" dirty="0">
-                <a:solidFill>
-                  <a:srgbClr val="146EBA"/>
-                </a:solidFill>
-                <a:uFill>
-                  <a:solidFill>
-                    <a:srgbClr val="FFFFFF"/>
-                  </a:solidFill>
-                </a:uFill>
-                <a:hlinkClick r:id="rId19"/>
-              </a:rPr>
-              <a:t>/training-material</a:t>
-            </a:r>
-            <a:r>
-              <a:rPr lang="en-US" sz="3200" spc="-1" dirty="0" smtClean="0">
-                <a:solidFill>
-                  <a:srgbClr val="146EBA"/>
-                </a:solidFill>
-                <a:uFill>
-                  <a:solidFill>
-                    <a:srgbClr val="FFFFFF"/>
-                  </a:solidFill>
-                </a:uFill>
-                <a:hlinkClick r:id="rId19"/>
-              </a:rPr>
-              <a:t>/</a:t>
+              <a:t>material</a:t>
             </a:r>
             <a:endParaRPr lang="en-US" sz="3200" spc="-1" dirty="0">
               <a:solidFill>

</xml_diff>